<commit_message>
Project task 2 added
</commit_message>
<xml_diff>
--- a/pj-task 1/Presentation.pptx
+++ b/pj-task 1/Presentation.pptx
@@ -8261,7 +8261,17 @@
         <a:p>
           <a:r>
             <a:rPr lang="en-US" dirty="0" smtClean="0"/>
-            <a:t>Doing software engineering</a:t>
+            <a:t>Doing software </a:t>
+          </a:r>
+          <a:r>
+            <a:rPr lang="en-US" dirty="0" smtClean="0"/>
+            <a:t>engineering</a:t>
+          </a:r>
+        </a:p>
+        <a:p>
+          <a:r>
+            <a:rPr lang="en-US" dirty="0" smtClean="0"/>
+            <a:t>Should complete this project</a:t>
           </a:r>
           <a:endParaRPr lang="en-US" dirty="0"/>
         </a:p>
@@ -8770,8 +8780,19 @@
         <a:p>
           <a:r>
             <a:rPr lang="en-US" dirty="0" smtClean="0"/>
-            <a:t>Lab Attendant </a:t>
+            <a:t>Lab </a:t>
           </a:r>
+          <a:r>
+            <a:rPr lang="en-US" dirty="0" smtClean="0"/>
+            <a:t>Attendant</a:t>
+          </a:r>
+        </a:p>
+        <a:p>
+          <a:r>
+            <a:rPr lang="en-US" dirty="0" smtClean="0"/>
+            <a:t>Get news from multiple social sites  </a:t>
+          </a:r>
+          <a:endParaRPr lang="en-US" dirty="0" smtClean="0"/>
         </a:p>
       </dgm:t>
     </dgm:pt>
@@ -9001,21 +9022,21 @@
     </dgm:pt>
   </dgm:ptLst>
   <dgm:cxnLst>
+    <dgm:cxn modelId="{C45B9C10-E86D-44E6-AA6C-C4D5B9FBB15B}" type="presOf" srcId="{0D2D528C-27EB-4A4B-8899-CC0B1E513959}" destId="{E54DB597-B9E9-4511-92BC-876589306F80}" srcOrd="1" destOrd="0" presId="urn:microsoft.com/office/officeart/2005/8/layout/matrix1"/>
+    <dgm:cxn modelId="{EAFD23F8-1AA9-4190-BDF0-7FA415D77E97}" type="presOf" srcId="{229C001B-E44D-40DB-93F0-C3699B047A94}" destId="{0711497E-2810-40A2-AE2D-155C59F83D90}" srcOrd="0" destOrd="0" presId="urn:microsoft.com/office/officeart/2005/8/layout/matrix1"/>
+    <dgm:cxn modelId="{E2DE4C84-AB1F-40A6-93C1-A194C0F57A09}" srcId="{AD6BF791-D786-4E99-8E00-06036AA67435}" destId="{86316C81-75E0-4E3D-BD29-B3CD334A0F75}" srcOrd="1" destOrd="0" parTransId="{2271C3B9-F940-41DF-BEC1-78EF403846B0}" sibTransId="{FF55A28C-F83D-4C30-A0BC-ADCF33D2BF6B}"/>
+    <dgm:cxn modelId="{0AD49FCA-2E3F-49E4-B630-48C04554CB00}" type="presOf" srcId="{0990FFEF-D516-4878-883F-E26A7B142968}" destId="{33FBB5B0-4567-4A08-BB22-1523D6800A16}" srcOrd="0" destOrd="0" presId="urn:microsoft.com/office/officeart/2005/8/layout/matrix1"/>
+    <dgm:cxn modelId="{8E8F808D-71E4-4CAA-9977-8AFE21D3967D}" srcId="{AD6BF791-D786-4E99-8E00-06036AA67435}" destId="{0D2D528C-27EB-4A4B-8899-CC0B1E513959}" srcOrd="0" destOrd="0" parTransId="{0616D2A0-0B14-42D2-9C6E-F35D295C2E1D}" sibTransId="{4E91D338-55DA-4AE9-842C-BEFD8709A81A}"/>
+    <dgm:cxn modelId="{C621EE59-4D38-415F-B872-242514F8AEC7}" srcId="{AD6BF791-D786-4E99-8E00-06036AA67435}" destId="{229C001B-E44D-40DB-93F0-C3699B047A94}" srcOrd="3" destOrd="0" parTransId="{BF06A1F3-5585-48DE-945C-6A18AB058C1C}" sibTransId="{4C041CA2-8B61-4A8E-8A6D-EB96A92846BF}"/>
+    <dgm:cxn modelId="{FBCAB315-7D1D-41AC-B6EC-A67C2DD97DB5}" srcId="{AD6BF791-D786-4E99-8E00-06036AA67435}" destId="{0990FFEF-D516-4878-883F-E26A7B142968}" srcOrd="2" destOrd="0" parTransId="{715B8F59-4EAD-44DB-B61F-E461AA2A850D}" sibTransId="{56C102A7-C8B3-47F0-B63F-86FC718CB54C}"/>
+    <dgm:cxn modelId="{AB8A60FB-A0FB-41FD-BCC5-E6C935CFDAC9}" type="presOf" srcId="{0990FFEF-D516-4878-883F-E26A7B142968}" destId="{D6B5C2E0-D706-4AE6-B200-69F25027826E}" srcOrd="1" destOrd="0" presId="urn:microsoft.com/office/officeart/2005/8/layout/matrix1"/>
+    <dgm:cxn modelId="{1FB6A425-A261-4810-90D1-96FC2216E8EA}" type="presOf" srcId="{86316C81-75E0-4E3D-BD29-B3CD334A0F75}" destId="{5FADD91B-F0C0-43E9-8B01-F9A315545196}" srcOrd="0" destOrd="0" presId="urn:microsoft.com/office/officeart/2005/8/layout/matrix1"/>
+    <dgm:cxn modelId="{822929CA-8E9F-438E-82B8-59615B0283C3}" type="presOf" srcId="{86316C81-75E0-4E3D-BD29-B3CD334A0F75}" destId="{C03103F9-1A74-4F6B-937E-CCEAAF8D2CF8}" srcOrd="1" destOrd="0" presId="urn:microsoft.com/office/officeart/2005/8/layout/matrix1"/>
+    <dgm:cxn modelId="{220C931B-0258-49D8-951B-2D86CF473D6D}" type="presOf" srcId="{DC76EC73-A411-48B9-A1C5-92A3E9D1D33C}" destId="{3EB7C3A5-3742-4546-BE40-209B6B4B9DFF}" srcOrd="0" destOrd="0" presId="urn:microsoft.com/office/officeart/2005/8/layout/matrix1"/>
+    <dgm:cxn modelId="{91CEA0A7-AADC-407C-93F4-E3F8ABF51CE2}" type="presOf" srcId="{AD6BF791-D786-4E99-8E00-06036AA67435}" destId="{C2C4838D-CC30-47EB-ADB9-040BDF13D45B}" srcOrd="0" destOrd="0" presId="urn:microsoft.com/office/officeart/2005/8/layout/matrix1"/>
+    <dgm:cxn modelId="{E0A3F5EF-041E-4DF6-8FED-ECA8EC93D1E0}" srcId="{DC76EC73-A411-48B9-A1C5-92A3E9D1D33C}" destId="{AD6BF791-D786-4E99-8E00-06036AA67435}" srcOrd="0" destOrd="0" parTransId="{8C827116-6758-49F8-839F-9C22406503FE}" sibTransId="{85BD04C1-A697-4162-B689-64220BA04D51}"/>
     <dgm:cxn modelId="{EE92E9E1-5824-4B22-B225-5C1E367AE3BD}" type="presOf" srcId="{0D2D528C-27EB-4A4B-8899-CC0B1E513959}" destId="{070DC4DE-A33A-4A36-9B7B-DC1F0152226C}" srcOrd="0" destOrd="0" presId="urn:microsoft.com/office/officeart/2005/8/layout/matrix1"/>
-    <dgm:cxn modelId="{220C931B-0258-49D8-951B-2D86CF473D6D}" type="presOf" srcId="{DC76EC73-A411-48B9-A1C5-92A3E9D1D33C}" destId="{3EB7C3A5-3742-4546-BE40-209B6B4B9DFF}" srcOrd="0" destOrd="0" presId="urn:microsoft.com/office/officeart/2005/8/layout/matrix1"/>
-    <dgm:cxn modelId="{C621EE59-4D38-415F-B872-242514F8AEC7}" srcId="{AD6BF791-D786-4E99-8E00-06036AA67435}" destId="{229C001B-E44D-40DB-93F0-C3699B047A94}" srcOrd="3" destOrd="0" parTransId="{BF06A1F3-5585-48DE-945C-6A18AB058C1C}" sibTransId="{4C041CA2-8B61-4A8E-8A6D-EB96A92846BF}"/>
-    <dgm:cxn modelId="{0AD49FCA-2E3F-49E4-B630-48C04554CB00}" type="presOf" srcId="{0990FFEF-D516-4878-883F-E26A7B142968}" destId="{33FBB5B0-4567-4A08-BB22-1523D6800A16}" srcOrd="0" destOrd="0" presId="urn:microsoft.com/office/officeart/2005/8/layout/matrix1"/>
-    <dgm:cxn modelId="{AB8A60FB-A0FB-41FD-BCC5-E6C935CFDAC9}" type="presOf" srcId="{0990FFEF-D516-4878-883F-E26A7B142968}" destId="{D6B5C2E0-D706-4AE6-B200-69F25027826E}" srcOrd="1" destOrd="0" presId="urn:microsoft.com/office/officeart/2005/8/layout/matrix1"/>
     <dgm:cxn modelId="{7AF6BA69-7A1F-4C4A-8754-9191C9413545}" type="presOf" srcId="{229C001B-E44D-40DB-93F0-C3699B047A94}" destId="{7C51DA05-D537-4A60-BD8C-B7D72B03D793}" srcOrd="1" destOrd="0" presId="urn:microsoft.com/office/officeart/2005/8/layout/matrix1"/>
-    <dgm:cxn modelId="{FBCAB315-7D1D-41AC-B6EC-A67C2DD97DB5}" srcId="{AD6BF791-D786-4E99-8E00-06036AA67435}" destId="{0990FFEF-D516-4878-883F-E26A7B142968}" srcOrd="2" destOrd="0" parTransId="{715B8F59-4EAD-44DB-B61F-E461AA2A850D}" sibTransId="{56C102A7-C8B3-47F0-B63F-86FC718CB54C}"/>
-    <dgm:cxn modelId="{8E8F808D-71E4-4CAA-9977-8AFE21D3967D}" srcId="{AD6BF791-D786-4E99-8E00-06036AA67435}" destId="{0D2D528C-27EB-4A4B-8899-CC0B1E513959}" srcOrd="0" destOrd="0" parTransId="{0616D2A0-0B14-42D2-9C6E-F35D295C2E1D}" sibTransId="{4E91D338-55DA-4AE9-842C-BEFD8709A81A}"/>
-    <dgm:cxn modelId="{E2DE4C84-AB1F-40A6-93C1-A194C0F57A09}" srcId="{AD6BF791-D786-4E99-8E00-06036AA67435}" destId="{86316C81-75E0-4E3D-BD29-B3CD334A0F75}" srcOrd="1" destOrd="0" parTransId="{2271C3B9-F940-41DF-BEC1-78EF403846B0}" sibTransId="{FF55A28C-F83D-4C30-A0BC-ADCF33D2BF6B}"/>
-    <dgm:cxn modelId="{91CEA0A7-AADC-407C-93F4-E3F8ABF51CE2}" type="presOf" srcId="{AD6BF791-D786-4E99-8E00-06036AA67435}" destId="{C2C4838D-CC30-47EB-ADB9-040BDF13D45B}" srcOrd="0" destOrd="0" presId="urn:microsoft.com/office/officeart/2005/8/layout/matrix1"/>
-    <dgm:cxn modelId="{822929CA-8E9F-438E-82B8-59615B0283C3}" type="presOf" srcId="{86316C81-75E0-4E3D-BD29-B3CD334A0F75}" destId="{C03103F9-1A74-4F6B-937E-CCEAAF8D2CF8}" srcOrd="1" destOrd="0" presId="urn:microsoft.com/office/officeart/2005/8/layout/matrix1"/>
-    <dgm:cxn modelId="{1FB6A425-A261-4810-90D1-96FC2216E8EA}" type="presOf" srcId="{86316C81-75E0-4E3D-BD29-B3CD334A0F75}" destId="{5FADD91B-F0C0-43E9-8B01-F9A315545196}" srcOrd="0" destOrd="0" presId="urn:microsoft.com/office/officeart/2005/8/layout/matrix1"/>
-    <dgm:cxn modelId="{EAFD23F8-1AA9-4190-BDF0-7FA415D77E97}" type="presOf" srcId="{229C001B-E44D-40DB-93F0-C3699B047A94}" destId="{0711497E-2810-40A2-AE2D-155C59F83D90}" srcOrd="0" destOrd="0" presId="urn:microsoft.com/office/officeart/2005/8/layout/matrix1"/>
-    <dgm:cxn modelId="{E0A3F5EF-041E-4DF6-8FED-ECA8EC93D1E0}" srcId="{DC76EC73-A411-48B9-A1C5-92A3E9D1D33C}" destId="{AD6BF791-D786-4E99-8E00-06036AA67435}" srcOrd="0" destOrd="0" parTransId="{8C827116-6758-49F8-839F-9C22406503FE}" sibTransId="{85BD04C1-A697-4162-B689-64220BA04D51}"/>
-    <dgm:cxn modelId="{C45B9C10-E86D-44E6-AA6C-C4D5B9FBB15B}" type="presOf" srcId="{0D2D528C-27EB-4A4B-8899-CC0B1E513959}" destId="{E54DB597-B9E9-4511-92BC-876589306F80}" srcOrd="1" destOrd="0" presId="urn:microsoft.com/office/officeart/2005/8/layout/matrix1"/>
     <dgm:cxn modelId="{87B24495-F723-4713-8283-B8F8A9BA0E2F}" type="presParOf" srcId="{3EB7C3A5-3742-4546-BE40-209B6B4B9DFF}" destId="{279092E3-8414-4446-B88C-904E715E04B2}" srcOrd="0" destOrd="0" presId="urn:microsoft.com/office/officeart/2005/8/layout/matrix1"/>
     <dgm:cxn modelId="{F9C9FA1D-D589-4F50-8D2F-F846DDCEC988}" type="presParOf" srcId="{279092E3-8414-4446-B88C-904E715E04B2}" destId="{070DC4DE-A33A-4A36-9B7B-DC1F0152226C}" srcOrd="0" destOrd="0" presId="urn:microsoft.com/office/officeart/2005/8/layout/matrix1"/>
     <dgm:cxn modelId="{B81700DE-2F26-4C6D-83EC-F8A8AFBC9D65}" type="presParOf" srcId="{279092E3-8414-4446-B88C-904E715E04B2}" destId="{E54DB597-B9E9-4511-92BC-876589306F80}" srcOrd="1" destOrd="0" presId="urn:microsoft.com/office/officeart/2005/8/layout/matrix1"/>
@@ -9259,8 +9280,19 @@
         <a:p>
           <a:r>
             <a:rPr lang="en-US" dirty="0" smtClean="0"/>
-            <a:t>CS student</a:t>
+            <a:t>CS </a:t>
           </a:r>
+          <a:r>
+            <a:rPr lang="en-US" dirty="0" smtClean="0"/>
+            <a:t>student</a:t>
+          </a:r>
+        </a:p>
+        <a:p>
+          <a:r>
+            <a:rPr lang="en-US" dirty="0" smtClean="0"/>
+            <a:t>Watch TV news and political shows  </a:t>
+          </a:r>
+          <a:endParaRPr lang="en-US" dirty="0" smtClean="0"/>
         </a:p>
       </dgm:t>
     </dgm:pt>
@@ -9317,8 +9349,23 @@
         <a:p>
           <a:r>
             <a:rPr lang="en-US" dirty="0" smtClean="0"/>
-            <a:t>Consider it a good and will be beneficial </a:t>
+            <a:t>Consider it a good and will be </a:t>
           </a:r>
+          <a:r>
+            <a:rPr lang="en-US" dirty="0" smtClean="0"/>
+            <a:t>beneficial</a:t>
+          </a:r>
+        </a:p>
+        <a:p>
+          <a:r>
+            <a:rPr lang="en-US" dirty="0" err="1" smtClean="0"/>
+            <a:t>Tv</a:t>
+          </a:r>
+          <a:r>
+            <a:rPr lang="en-US" dirty="0" smtClean="0"/>
+            <a:t> news are biased  </a:t>
+          </a:r>
+          <a:endParaRPr lang="en-US" dirty="0" smtClean="0"/>
         </a:p>
         <a:p>
           <a:endParaRPr lang="en-US" dirty="0" smtClean="0"/>
@@ -9757,8 +9804,19 @@
         <a:p>
           <a:r>
             <a:rPr lang="en-US" dirty="0" smtClean="0"/>
-            <a:t>CS student</a:t>
+            <a:t>CS </a:t>
           </a:r>
+          <a:r>
+            <a:rPr lang="en-US" dirty="0" smtClean="0"/>
+            <a:t>student</a:t>
+          </a:r>
+        </a:p>
+        <a:p>
+          <a:r>
+            <a:rPr lang="en-US" dirty="0" smtClean="0"/>
+            <a:t>Source of information are social sites </a:t>
+          </a:r>
+          <a:endParaRPr lang="en-US" dirty="0" smtClean="0"/>
         </a:p>
       </dgm:t>
     </dgm:pt>
@@ -10258,8 +10316,15 @@
         <a:p>
           <a:r>
             <a:rPr lang="en-US" dirty="0" smtClean="0"/>
-            <a:t>Microbiologist </a:t>
+            <a:t>Microbiologist</a:t>
           </a:r>
+        </a:p>
+        <a:p>
+          <a:r>
+            <a:rPr lang="en-US" dirty="0" smtClean="0"/>
+            <a:t>News paper and Facebook  </a:t>
+          </a:r>
+          <a:endParaRPr lang="en-US" dirty="0" smtClean="0"/>
         </a:p>
       </dgm:t>
     </dgm:pt>
@@ -10982,7 +11047,28 @@
           </a:pPr>
           <a:r>
             <a:rPr lang="en-US" sz="1600" kern="1200" dirty="0" smtClean="0"/>
-            <a:t>Doing software engineering</a:t>
+            <a:t>Doing software </a:t>
+          </a:r>
+          <a:r>
+            <a:rPr lang="en-US" sz="1600" kern="1200" dirty="0" smtClean="0"/>
+            <a:t>engineering</a:t>
+          </a:r>
+        </a:p>
+        <a:p>
+          <a:pPr lvl="0" algn="ctr" defTabSz="711200">
+            <a:lnSpc>
+              <a:spcPct val="90000"/>
+            </a:lnSpc>
+            <a:spcBef>
+              <a:spcPct val="0"/>
+            </a:spcBef>
+            <a:spcAft>
+              <a:spcPct val="35000"/>
+            </a:spcAft>
+          </a:pPr>
+          <a:r>
+            <a:rPr lang="en-US" sz="1600" kern="1200" dirty="0" smtClean="0"/>
+            <a:t>Should complete this project</a:t>
           </a:r>
           <a:endParaRPr lang="en-US" sz="1600" kern="1200" dirty="0"/>
         </a:p>
@@ -11663,8 +11749,30 @@
           </a:pPr>
           <a:r>
             <a:rPr lang="en-US" sz="2000" kern="1200" dirty="0" smtClean="0"/>
-            <a:t>Lab Attendant </a:t>
+            <a:t>Lab </a:t>
           </a:r>
+          <a:r>
+            <a:rPr lang="en-US" sz="2000" kern="1200" dirty="0" smtClean="0"/>
+            <a:t>Attendant</a:t>
+          </a:r>
+        </a:p>
+        <a:p>
+          <a:pPr lvl="0" algn="ctr" defTabSz="889000">
+            <a:lnSpc>
+              <a:spcPct val="90000"/>
+            </a:lnSpc>
+            <a:spcBef>
+              <a:spcPct val="0"/>
+            </a:spcBef>
+            <a:spcAft>
+              <a:spcPct val="35000"/>
+            </a:spcAft>
+          </a:pPr>
+          <a:r>
+            <a:rPr lang="en-US" sz="2000" kern="1200" dirty="0" smtClean="0"/>
+            <a:t>Get news from multiple social sites  </a:t>
+          </a:r>
+          <a:endParaRPr lang="en-US" sz="2000" kern="1200" dirty="0" smtClean="0"/>
         </a:p>
       </dsp:txBody>
       <dsp:txXfrm rot="10800000">
@@ -12157,12 +12265,12 @@
         </a:fontRef>
       </dsp:style>
       <dsp:txBody>
-        <a:bodyPr spcFirstLastPara="0" vert="horz" wrap="square" lIns="106680" tIns="106680" rIns="106680" bIns="106680" numCol="1" spcCol="1270" anchor="ctr" anchorCtr="0">
+        <a:bodyPr spcFirstLastPara="0" vert="horz" wrap="square" lIns="99568" tIns="99568" rIns="99568" bIns="99568" numCol="1" spcCol="1270" anchor="ctr" anchorCtr="0">
           <a:noAutofit/>
         </a:bodyPr>
         <a:lstStyle/>
         <a:p>
-          <a:pPr lvl="0" algn="ctr" defTabSz="666750">
+          <a:pPr lvl="0" algn="ctr" defTabSz="622300">
             <a:lnSpc>
               <a:spcPct val="90000"/>
             </a:lnSpc>
@@ -12174,12 +12282,12 @@
             </a:spcAft>
           </a:pPr>
           <a:r>
-            <a:rPr lang="en-US" sz="1500" kern="1200" dirty="0" smtClean="0"/>
+            <a:rPr lang="en-US" sz="1400" kern="1200" dirty="0" smtClean="0"/>
             <a:t>Think</a:t>
           </a:r>
         </a:p>
         <a:p>
-          <a:pPr lvl="0" algn="ctr" defTabSz="666750">
+          <a:pPr lvl="0" algn="ctr" defTabSz="622300">
             <a:lnSpc>
               <a:spcPct val="90000"/>
             </a:lnSpc>
@@ -12191,7 +12299,7 @@
             </a:spcAft>
           </a:pPr>
           <a:r>
-            <a:rPr lang="en-US" sz="1500" kern="1200" dirty="0" smtClean="0"/>
+            <a:rPr lang="en-US" sz="1400" kern="1200" dirty="0" smtClean="0"/>
             <a:t>Thinks media is biased towards specific political parties</a:t>
           </a:r>
         </a:p>
@@ -12245,12 +12353,12 @@
         </a:fontRef>
       </dsp:style>
       <dsp:txBody>
-        <a:bodyPr spcFirstLastPara="0" vert="horz" wrap="square" lIns="106680" tIns="106680" rIns="106680" bIns="106680" numCol="1" spcCol="1270" anchor="ctr" anchorCtr="0">
+        <a:bodyPr spcFirstLastPara="0" vert="horz" wrap="square" lIns="99568" tIns="99568" rIns="99568" bIns="99568" numCol="1" spcCol="1270" anchor="ctr" anchorCtr="0">
           <a:noAutofit/>
         </a:bodyPr>
         <a:lstStyle/>
         <a:p>
-          <a:pPr lvl="0" algn="ctr" defTabSz="666750">
+          <a:pPr lvl="0" algn="ctr" defTabSz="622300">
             <a:lnSpc>
               <a:spcPct val="90000"/>
             </a:lnSpc>
@@ -12262,12 +12370,12 @@
             </a:spcAft>
           </a:pPr>
           <a:r>
-            <a:rPr lang="en-US" sz="1500" kern="1200" dirty="0" smtClean="0"/>
+            <a:rPr lang="en-US" sz="1400" kern="1200" dirty="0" smtClean="0"/>
             <a:t>Do</a:t>
           </a:r>
         </a:p>
         <a:p>
-          <a:pPr lvl="0" algn="ctr" defTabSz="666750">
+          <a:pPr lvl="0" algn="ctr" defTabSz="622300">
             <a:lnSpc>
               <a:spcPct val="90000"/>
             </a:lnSpc>
@@ -12279,9 +12387,31 @@
             </a:spcAft>
           </a:pPr>
           <a:r>
-            <a:rPr lang="en-US" sz="1500" kern="1200" dirty="0" smtClean="0"/>
-            <a:t>CS student</a:t>
+            <a:rPr lang="en-US" sz="1400" kern="1200" dirty="0" smtClean="0"/>
+            <a:t>CS </a:t>
           </a:r>
+          <a:r>
+            <a:rPr lang="en-US" sz="1400" kern="1200" dirty="0" smtClean="0"/>
+            <a:t>student</a:t>
+          </a:r>
+        </a:p>
+        <a:p>
+          <a:pPr lvl="0" algn="ctr" defTabSz="622300">
+            <a:lnSpc>
+              <a:spcPct val="90000"/>
+            </a:lnSpc>
+            <a:spcBef>
+              <a:spcPct val="0"/>
+            </a:spcBef>
+            <a:spcAft>
+              <a:spcPct val="35000"/>
+            </a:spcAft>
+          </a:pPr>
+          <a:r>
+            <a:rPr lang="en-US" sz="1400" kern="1200" dirty="0" smtClean="0"/>
+            <a:t>Watch TV news and political shows  </a:t>
+          </a:r>
+          <a:endParaRPr lang="en-US" sz="1400" kern="1200" dirty="0" smtClean="0"/>
         </a:p>
       </dsp:txBody>
       <dsp:txXfrm rot="10800000">
@@ -12333,12 +12463,12 @@
         </a:fontRef>
       </dsp:style>
       <dsp:txBody>
-        <a:bodyPr spcFirstLastPara="0" vert="horz" wrap="square" lIns="106680" tIns="106680" rIns="106680" bIns="106680" numCol="1" spcCol="1270" anchor="ctr" anchorCtr="0">
+        <a:bodyPr spcFirstLastPara="0" vert="horz" wrap="square" lIns="99568" tIns="99568" rIns="99568" bIns="99568" numCol="1" spcCol="1270" anchor="ctr" anchorCtr="0">
           <a:noAutofit/>
         </a:bodyPr>
         <a:lstStyle/>
         <a:p>
-          <a:pPr lvl="0" algn="ctr" defTabSz="666750">
+          <a:pPr lvl="0" algn="ctr" defTabSz="622300">
             <a:lnSpc>
               <a:spcPct val="90000"/>
             </a:lnSpc>
@@ -12350,12 +12480,12 @@
             </a:spcAft>
           </a:pPr>
           <a:r>
-            <a:rPr lang="en-US" sz="1500" kern="1200" dirty="0" smtClean="0"/>
+            <a:rPr lang="en-US" sz="1400" kern="1200" dirty="0" smtClean="0"/>
             <a:t>Feel</a:t>
           </a:r>
         </a:p>
         <a:p>
-          <a:pPr lvl="0" algn="ctr" defTabSz="666750">
+          <a:pPr lvl="0" algn="ctr" defTabSz="622300">
             <a:lnSpc>
               <a:spcPct val="90000"/>
             </a:lnSpc>
@@ -12367,12 +12497,12 @@
             </a:spcAft>
           </a:pPr>
           <a:r>
-            <a:rPr lang="en-US" sz="1500" kern="1200" dirty="0" smtClean="0"/>
+            <a:rPr lang="en-US" sz="1400" kern="1200" dirty="0" smtClean="0"/>
             <a:t>Do not like to post on social sites</a:t>
           </a:r>
         </a:p>
         <a:p>
-          <a:pPr lvl="0" algn="ctr" defTabSz="666750">
+          <a:pPr lvl="0" algn="ctr" defTabSz="622300">
             <a:lnSpc>
               <a:spcPct val="90000"/>
             </a:lnSpc>
@@ -12384,12 +12514,12 @@
             </a:spcAft>
           </a:pPr>
           <a:r>
-            <a:rPr lang="en-US" sz="1500" kern="1200" dirty="0" smtClean="0"/>
+            <a:rPr lang="en-US" sz="1400" kern="1200" dirty="0" smtClean="0"/>
             <a:t>Much</a:t>
           </a:r>
         </a:p>
         <a:p>
-          <a:pPr lvl="0" algn="ctr" defTabSz="666750">
+          <a:pPr lvl="0" algn="ctr" defTabSz="622300">
             <a:lnSpc>
               <a:spcPct val="90000"/>
             </a:lnSpc>
@@ -12401,12 +12531,16 @@
             </a:spcAft>
           </a:pPr>
           <a:r>
-            <a:rPr lang="en-US" sz="1500" kern="1200" dirty="0" smtClean="0"/>
-            <a:t>Consider it a good and will be beneficial </a:t>
+            <a:rPr lang="en-US" sz="1400" kern="1200" dirty="0" smtClean="0"/>
+            <a:t>Consider it a good and will be </a:t>
+          </a:r>
+          <a:r>
+            <a:rPr lang="en-US" sz="1400" kern="1200" dirty="0" smtClean="0"/>
+            <a:t>beneficial</a:t>
           </a:r>
         </a:p>
         <a:p>
-          <a:pPr lvl="0" algn="ctr" defTabSz="666750">
+          <a:pPr lvl="0" algn="ctr" defTabSz="622300">
             <a:lnSpc>
               <a:spcPct val="90000"/>
             </a:lnSpc>
@@ -12417,10 +12551,18 @@
               <a:spcPct val="35000"/>
             </a:spcAft>
           </a:pPr>
-          <a:endParaRPr lang="en-US" sz="1500" kern="1200" dirty="0" smtClean="0"/>
+          <a:r>
+            <a:rPr lang="en-US" sz="1400" kern="1200" dirty="0" err="1" smtClean="0"/>
+            <a:t>Tv</a:t>
+          </a:r>
+          <a:r>
+            <a:rPr lang="en-US" sz="1400" kern="1200" dirty="0" smtClean="0"/>
+            <a:t> news are biased  </a:t>
+          </a:r>
+          <a:endParaRPr lang="en-US" sz="1400" kern="1200" dirty="0" smtClean="0"/>
         </a:p>
         <a:p>
-          <a:pPr lvl="0" algn="ctr" defTabSz="666750">
+          <a:pPr lvl="0" algn="ctr" defTabSz="622300">
             <a:lnSpc>
               <a:spcPct val="90000"/>
             </a:lnSpc>
@@ -12431,7 +12573,21 @@
               <a:spcPct val="35000"/>
             </a:spcAft>
           </a:pPr>
-          <a:endParaRPr lang="en-US" sz="1500" kern="1200" dirty="0"/>
+          <a:endParaRPr lang="en-US" sz="1400" kern="1200" dirty="0" smtClean="0"/>
+        </a:p>
+        <a:p>
+          <a:pPr lvl="0" algn="ctr" defTabSz="622300">
+            <a:lnSpc>
+              <a:spcPct val="90000"/>
+            </a:lnSpc>
+            <a:spcBef>
+              <a:spcPct val="0"/>
+            </a:spcBef>
+            <a:spcAft>
+              <a:spcPct val="35000"/>
+            </a:spcAft>
+          </a:pPr>
+          <a:endParaRPr lang="en-US" sz="1400" kern="1200" dirty="0"/>
         </a:p>
       </dsp:txBody>
       <dsp:txXfrm rot="-5400000">
@@ -12481,12 +12637,12 @@
         <a:fontRef idx="minor"/>
       </dsp:style>
       <dsp:txBody>
-        <a:bodyPr spcFirstLastPara="0" vert="horz" wrap="square" lIns="57150" tIns="57150" rIns="57150" bIns="57150" numCol="1" spcCol="1270" anchor="ctr" anchorCtr="0">
+        <a:bodyPr spcFirstLastPara="0" vert="horz" wrap="square" lIns="53340" tIns="53340" rIns="53340" bIns="53340" numCol="1" spcCol="1270" anchor="ctr" anchorCtr="0">
           <a:noAutofit/>
         </a:bodyPr>
         <a:lstStyle/>
         <a:p>
-          <a:pPr lvl="0" algn="ctr" defTabSz="666750">
+          <a:pPr lvl="0" algn="ctr" defTabSz="622300">
             <a:lnSpc>
               <a:spcPct val="90000"/>
             </a:lnSpc>
@@ -12498,14 +12654,14 @@
             </a:spcAft>
           </a:pPr>
           <a:r>
-            <a:rPr lang="en-US" sz="1500" kern="1200" dirty="0" smtClean="0">
+            <a:rPr lang="en-US" sz="1400" kern="1200" dirty="0" smtClean="0">
               <a:solidFill>
                 <a:schemeClr val="bg1"/>
               </a:solidFill>
             </a:rPr>
             <a:t>Empathy Map</a:t>
           </a:r>
-          <a:endParaRPr lang="en-US" sz="1500" kern="1200" dirty="0">
+          <a:endParaRPr lang="en-US" sz="1400" kern="1200" dirty="0">
             <a:solidFill>
               <a:schemeClr val="bg1"/>
             </a:solidFill>
@@ -12928,8 +13084,30 @@
           </a:pPr>
           <a:r>
             <a:rPr lang="en-US" sz="1700" kern="1200" dirty="0" smtClean="0"/>
-            <a:t>CS student</a:t>
+            <a:t>CS </a:t>
           </a:r>
+          <a:r>
+            <a:rPr lang="en-US" sz="1700" kern="1200" dirty="0" smtClean="0"/>
+            <a:t>student</a:t>
+          </a:r>
+        </a:p>
+        <a:p>
+          <a:pPr lvl="0" algn="ctr" defTabSz="755650">
+            <a:lnSpc>
+              <a:spcPct val="90000"/>
+            </a:lnSpc>
+            <a:spcBef>
+              <a:spcPct val="0"/>
+            </a:spcBef>
+            <a:spcAft>
+              <a:spcPct val="35000"/>
+            </a:spcAft>
+          </a:pPr>
+          <a:r>
+            <a:rPr lang="en-US" sz="1700" kern="1200" dirty="0" smtClean="0"/>
+            <a:t>Source of information are social sites </a:t>
+          </a:r>
+          <a:endParaRPr lang="en-US" sz="1700" kern="1200" dirty="0" smtClean="0"/>
         </a:p>
       </dsp:txBody>
       <dsp:txXfrm rot="10800000">
@@ -13579,8 +13757,26 @@
           </a:pPr>
           <a:r>
             <a:rPr lang="en-US" sz="1700" kern="1200" dirty="0" smtClean="0"/>
-            <a:t>Microbiologist </a:t>
+            <a:t>Microbiologist</a:t>
           </a:r>
+        </a:p>
+        <a:p>
+          <a:pPr lvl="0" algn="ctr" defTabSz="755650">
+            <a:lnSpc>
+              <a:spcPct val="90000"/>
+            </a:lnSpc>
+            <a:spcBef>
+              <a:spcPct val="0"/>
+            </a:spcBef>
+            <a:spcAft>
+              <a:spcPct val="35000"/>
+            </a:spcAft>
+          </a:pPr>
+          <a:r>
+            <a:rPr lang="en-US" sz="1700" kern="1200" dirty="0" smtClean="0"/>
+            <a:t>News paper and Facebook  </a:t>
+          </a:r>
+          <a:endParaRPr lang="en-US" sz="1700" kern="1200" dirty="0" smtClean="0"/>
         </a:p>
       </dsp:txBody>
       <dsp:txXfrm rot="10800000">
@@ -40046,7 +40242,11 @@
             </a:br>
             <a:r>
               <a:rPr lang="en-US" sz="2400" dirty="0" smtClean="0"/>
-              <a:t>Profession: </a:t>
+              <a:t>Profession</a:t>
+            </a:r>
+            <a:r>
+              <a:rPr lang="en-US" sz="2400" dirty="0" smtClean="0"/>
+              <a:t>: Student </a:t>
             </a:r>
             <a:endParaRPr lang="en-US" sz="2400" dirty="0"/>
           </a:p>
@@ -40062,7 +40262,12 @@
             <p:ph type="body" idx="1"/>
           </p:nvPr>
         </p:nvSpPr>
-        <p:spPr/>
+        <p:spPr>
+          <a:xfrm>
+            <a:off x="6895559" y="2690523"/>
+            <a:ext cx="3757545" cy="2283824"/>
+          </a:xfrm>
+        </p:spPr>
         <p:txBody>
           <a:bodyPr/>
           <a:lstStyle/>
@@ -40122,7 +40327,7 @@
           <p:nvPr>
             <p:extLst>
               <p:ext uri="{D42A27DB-BD31-4B8C-83A1-F6EECF244321}">
-                <p14:modId xmlns:p14="http://schemas.microsoft.com/office/powerpoint/2010/main" val="1407881441"/>
+                <p14:modId xmlns:p14="http://schemas.microsoft.com/office/powerpoint/2010/main" val="2772330091"/>
               </p:ext>
             </p:extLst>
           </p:nvPr>
@@ -40290,7 +40495,7 @@
           <p:nvPr>
             <p:extLst>
               <p:ext uri="{D42A27DB-BD31-4B8C-83A1-F6EECF244321}">
-                <p14:modId xmlns:p14="http://schemas.microsoft.com/office/powerpoint/2010/main" val="1992741705"/>
+                <p14:modId xmlns:p14="http://schemas.microsoft.com/office/powerpoint/2010/main" val="959961592"/>
               </p:ext>
             </p:extLst>
           </p:nvPr>
@@ -40450,7 +40655,7 @@
           <p:nvPr>
             <p:extLst>
               <p:ext uri="{D42A27DB-BD31-4B8C-83A1-F6EECF244321}">
-                <p14:modId xmlns:p14="http://schemas.microsoft.com/office/powerpoint/2010/main" val="1302267682"/>
+                <p14:modId xmlns:p14="http://schemas.microsoft.com/office/powerpoint/2010/main" val="1349331941"/>
               </p:ext>
             </p:extLst>
           </p:nvPr>
@@ -40610,7 +40815,7 @@
           <p:nvPr>
             <p:extLst>
               <p:ext uri="{D42A27DB-BD31-4B8C-83A1-F6EECF244321}">
-                <p14:modId xmlns:p14="http://schemas.microsoft.com/office/powerpoint/2010/main" val="2716384139"/>
+                <p14:modId xmlns:p14="http://schemas.microsoft.com/office/powerpoint/2010/main" val="4277612889"/>
               </p:ext>
             </p:extLst>
           </p:nvPr>
@@ -40774,7 +40979,7 @@
           <p:nvPr>
             <p:extLst>
               <p:ext uri="{D42A27DB-BD31-4B8C-83A1-F6EECF244321}">
-                <p14:modId xmlns:p14="http://schemas.microsoft.com/office/powerpoint/2010/main" val="578113806"/>
+                <p14:modId xmlns:p14="http://schemas.microsoft.com/office/powerpoint/2010/main" val="717192011"/>
               </p:ext>
             </p:extLst>
           </p:nvPr>

</xml_diff>